<commit_message>
Slides geändert. Spec. genauer formuliert
</commit_message>
<xml_diff>
--- a/isp/ISP.pptx
+++ b/isp/ISP.pptx
@@ -5,26 +5,27 @@
     <p:sldMasterId id="2147483648" r:id="rId1"/>
   </p:sldMasterIdLst>
   <p:notesMasterIdLst>
-    <p:notesMasterId r:id="rId16"/>
+    <p:notesMasterId r:id="rId17"/>
   </p:notesMasterIdLst>
   <p:handoutMasterIdLst>
-    <p:handoutMasterId r:id="rId17"/>
+    <p:handoutMasterId r:id="rId18"/>
   </p:handoutMasterIdLst>
   <p:sldIdLst>
     <p:sldId id="256" r:id="rId2"/>
     <p:sldId id="264" r:id="rId3"/>
     <p:sldId id="260" r:id="rId4"/>
-    <p:sldId id="265" r:id="rId5"/>
-    <p:sldId id="258" r:id="rId6"/>
-    <p:sldId id="259" r:id="rId7"/>
-    <p:sldId id="261" r:id="rId8"/>
-    <p:sldId id="257" r:id="rId9"/>
-    <p:sldId id="262" r:id="rId10"/>
-    <p:sldId id="263" r:id="rId11"/>
-    <p:sldId id="267" r:id="rId12"/>
-    <p:sldId id="268" r:id="rId13"/>
-    <p:sldId id="269" r:id="rId14"/>
-    <p:sldId id="266" r:id="rId15"/>
+    <p:sldId id="270" r:id="rId5"/>
+    <p:sldId id="265" r:id="rId6"/>
+    <p:sldId id="258" r:id="rId7"/>
+    <p:sldId id="259" r:id="rId8"/>
+    <p:sldId id="261" r:id="rId9"/>
+    <p:sldId id="257" r:id="rId10"/>
+    <p:sldId id="262" r:id="rId11"/>
+    <p:sldId id="263" r:id="rId12"/>
+    <p:sldId id="267" r:id="rId13"/>
+    <p:sldId id="268" r:id="rId14"/>
+    <p:sldId id="269" r:id="rId15"/>
+    <p:sldId id="266" r:id="rId16"/>
   </p:sldIdLst>
   <p:sldSz cx="9144000" cy="6858000" type="screen4x3"/>
   <p:notesSz cx="6743700" cy="9875838"/>
@@ -155,7 +156,7 @@
   </p:defaultTextStyle>
   <p:extLst>
     <p:ext uri="{EFAFB233-063F-42B5-8137-9DF3F51BA10A}">
-      <p15:sldGuideLst xmlns:p15="http://schemas.microsoft.com/office/powerpoint/2012/main" xmlns="">
+      <p15:sldGuideLst xmlns="" xmlns:p15="http://schemas.microsoft.com/office/powerpoint/2012/main">
         <p15:guide id="1" orient="horz" pos="1556">
           <p15:clr>
             <a:srgbClr val="A4A3A4"/>
@@ -204,7 +205,7 @@
       </p15:sldGuideLst>
     </p:ext>
     <p:ext uri="{2D200454-40CA-4A62-9FC3-DE9A4176ACB9}">
-      <p15:notesGuideLst xmlns:p15="http://schemas.microsoft.com/office/powerpoint/2012/main" xmlns="">
+      <p15:notesGuideLst xmlns="" xmlns:p15="http://schemas.microsoft.com/office/powerpoint/2012/main">
         <p15:guide id="1" orient="horz" pos="3110">
           <p15:clr>
             <a:srgbClr val="A4A3A4"/>
@@ -4482,7 +4483,7 @@
           <a:p>
             <a:r>
               <a:rPr lang="de-DE" dirty="0" smtClean="0"/>
-              <a:t>Lösung: Delegation</a:t>
+              <a:t>Lösung: Interfaces Separieren</a:t>
             </a:r>
             <a:endParaRPr lang="de-DE" dirty="0"/>
           </a:p>
@@ -4530,6 +4531,162 @@
               <a:rPr lang="de-DE" smtClean="0"/>
               <a:pPr/>
               <a:t>10</a:t>
+            </a:fld>
+            <a:endParaRPr lang="de-DE" dirty="0"/>
+          </a:p>
+        </p:txBody>
+      </p:sp>
+      <p:pic>
+        <p:nvPicPr>
+          <p:cNvPr id="6146" name="Picture 2" descr="D:\Dropbox\neusta\Software Qualität\SOLID\Secont.jpg"/>
+          <p:cNvPicPr>
+            <a:picLocks noChangeAspect="1" noChangeArrowheads="1"/>
+          </p:cNvPicPr>
+          <p:nvPr/>
+        </p:nvPicPr>
+        <p:blipFill>
+          <a:blip r:embed="rId2">
+            <a:extLst>
+              <a:ext uri="{28A0092B-C50C-407E-A947-70E740481C1C}">
+                <a14:useLocalDpi xmlns:a14="http://schemas.microsoft.com/office/drawing/2010/main" val="0"/>
+              </a:ext>
+            </a:extLst>
+          </a:blip>
+          <a:srcRect/>
+          <a:stretch>
+            <a:fillRect/>
+          </a:stretch>
+        </p:blipFill>
+        <p:spPr bwMode="auto">
+          <a:xfrm>
+            <a:off x="395536" y="1556792"/>
+            <a:ext cx="7452041" cy="3672408"/>
+          </a:xfrm>
+          <a:prstGeom prst="rect">
+            <a:avLst/>
+          </a:prstGeom>
+          <a:noFill/>
+          <a:extLst>
+            <a:ext uri="{909E8E84-426E-40DD-AFC4-6F175D3DCCD1}">
+              <a14:hiddenFill xmlns:a14="http://schemas.microsoft.com/office/drawing/2010/main">
+                <a:solidFill>
+                  <a:srgbClr val="FFFFFF"/>
+                </a:solidFill>
+              </a14:hiddenFill>
+            </a:ext>
+          </a:extLst>
+        </p:spPr>
+      </p:pic>
+    </p:spTree>
+    <p:extLst>
+      <p:ext uri="{BB962C8B-B14F-4D97-AF65-F5344CB8AC3E}">
+        <p14:creationId xmlns:p14="http://schemas.microsoft.com/office/powerpoint/2010/main" val="1609465115"/>
+      </p:ext>
+    </p:extLst>
+  </p:cSld>
+  <p:clrMapOvr>
+    <a:masterClrMapping/>
+  </p:clrMapOvr>
+  <mc:AlternateContent xmlns:mc="http://schemas.openxmlformats.org/markup-compatibility/2006" xmlns:p14="http://schemas.microsoft.com/office/powerpoint/2010/main">
+    <mc:Choice Requires="p14">
+      <p:transition p14:dur="0"/>
+    </mc:Choice>
+    <mc:Fallback xmlns="">
+      <p:transition/>
+    </mc:Fallback>
+  </mc:AlternateContent>
+  <p:timing>
+    <p:tnLst>
+      <p:par>
+        <p:cTn id="1" dur="indefinite" restart="never" nodeType="tmRoot"/>
+      </p:par>
+    </p:tnLst>
+  </p:timing>
+</p:sld>
+</file>
+
+<file path=ppt/slides/slide11.xml><?xml version="1.0" encoding="utf-8"?>
+<p:sld xmlns:a="http://schemas.openxmlformats.org/drawingml/2006/main" xmlns:r="http://schemas.openxmlformats.org/officeDocument/2006/relationships" xmlns:p="http://schemas.openxmlformats.org/presentationml/2006/main">
+  <p:cSld>
+    <p:spTree>
+      <p:nvGrpSpPr>
+        <p:cNvPr id="1" name=""/>
+        <p:cNvGrpSpPr/>
+        <p:nvPr/>
+      </p:nvGrpSpPr>
+      <p:grpSpPr>
+        <a:xfrm>
+          <a:off x="0" y="0"/>
+          <a:ext cx="0" cy="0"/>
+          <a:chOff x="0" y="0"/>
+          <a:chExt cx="0" cy="0"/>
+        </a:xfrm>
+      </p:grpSpPr>
+      <p:sp>
+        <p:nvSpPr>
+          <p:cNvPr id="2" name="Titel 1"/>
+          <p:cNvSpPr>
+            <a:spLocks noGrp="1"/>
+          </p:cNvSpPr>
+          <p:nvPr>
+            <p:ph type="title"/>
+          </p:nvPr>
+        </p:nvSpPr>
+        <p:spPr/>
+        <p:txBody>
+          <a:bodyPr/>
+          <a:lstStyle/>
+          <a:p>
+            <a:r>
+              <a:rPr lang="de-DE" dirty="0" smtClean="0"/>
+              <a:t>Lösung: Delegation</a:t>
+            </a:r>
+            <a:endParaRPr lang="de-DE" dirty="0"/>
+          </a:p>
+        </p:txBody>
+      </p:sp>
+      <p:sp>
+        <p:nvSpPr>
+          <p:cNvPr id="4" name="Datumsplatzhalter 3"/>
+          <p:cNvSpPr>
+            <a:spLocks noGrp="1"/>
+          </p:cNvSpPr>
+          <p:nvPr>
+            <p:ph type="dt" sz="half" idx="11"/>
+          </p:nvPr>
+        </p:nvSpPr>
+        <p:spPr/>
+        <p:txBody>
+          <a:bodyPr/>
+          <a:lstStyle/>
+          <a:p>
+            <a:fld id="{963731B5-71BB-4A04-98EE-C4E60CDE0482}" type="datetime2">
+              <a:rPr lang="de-DE" smtClean="0"/>
+              <a:t>Donnerstag, 12. September 2013</a:t>
+            </a:fld>
+            <a:endParaRPr lang="de-DE" dirty="0"/>
+          </a:p>
+        </p:txBody>
+      </p:sp>
+      <p:sp>
+        <p:nvSpPr>
+          <p:cNvPr id="5" name="Foliennummernplatzhalter 4"/>
+          <p:cNvSpPr>
+            <a:spLocks noGrp="1"/>
+          </p:cNvSpPr>
+          <p:nvPr>
+            <p:ph type="sldNum" sz="quarter" idx="13"/>
+          </p:nvPr>
+        </p:nvSpPr>
+        <p:spPr/>
+        <p:txBody>
+          <a:bodyPr/>
+          <a:lstStyle/>
+          <a:p>
+            <a:fld id="{82183FE7-0049-48F5-AEC7-D407A93291DC}" type="slidenum">
+              <a:rPr lang="de-DE" smtClean="0"/>
+              <a:pPr/>
+              <a:t>11</a:t>
             </a:fld>
             <a:endParaRPr lang="de-DE" dirty="0"/>
           </a:p>
@@ -4674,7 +4831,7 @@
 </p:sld>
 </file>
 
-<file path=ppt/slides/slide11.xml><?xml version="1.0" encoding="utf-8"?>
+<file path=ppt/slides/slide12.xml><?xml version="1.0" encoding="utf-8"?>
 <p:sld xmlns:a="http://schemas.openxmlformats.org/drawingml/2006/main" xmlns:r="http://schemas.openxmlformats.org/officeDocument/2006/relationships" xmlns:p="http://schemas.openxmlformats.org/presentationml/2006/main">
   <p:cSld>
     <p:spTree>
@@ -4804,7 +4961,7 @@
             <a:fld id="{82183FE7-0049-48F5-AEC7-D407A93291DC}" type="slidenum">
               <a:rPr lang="de-DE" smtClean="0"/>
               <a:pPr/>
-              <a:t>11</a:t>
+              <a:t>12</a:t>
             </a:fld>
             <a:endParaRPr lang="de-DE" dirty="0"/>
           </a:p>
@@ -4828,10 +4985,17 @@
       <p:transition/>
     </mc:Fallback>
   </mc:AlternateContent>
+  <p:timing>
+    <p:tnLst>
+      <p:par>
+        <p:cTn id="1" dur="indefinite" restart="never" nodeType="tmRoot"/>
+      </p:par>
+    </p:tnLst>
+  </p:timing>
 </p:sld>
 </file>
 
-<file path=ppt/slides/slide12.xml><?xml version="1.0" encoding="utf-8"?>
+<file path=ppt/slides/slide13.xml><?xml version="1.0" encoding="utf-8"?>
 <p:sld xmlns:a="http://schemas.openxmlformats.org/drawingml/2006/main" xmlns:r="http://schemas.openxmlformats.org/officeDocument/2006/relationships" xmlns:p="http://schemas.openxmlformats.org/presentationml/2006/main">
   <p:cSld>
     <p:spTree>
@@ -4916,7 +5080,7 @@
             <a:fld id="{82183FE7-0049-48F5-AEC7-D407A93291DC}" type="slidenum">
               <a:rPr lang="de-DE" smtClean="0"/>
               <a:pPr/>
-              <a:t>12</a:t>
+              <a:t>13</a:t>
             </a:fld>
             <a:endParaRPr lang="de-DE" dirty="0"/>
           </a:p>
@@ -5454,7 +5618,7 @@
 </p:sld>
 </file>
 
-<file path=ppt/slides/slide13.xml><?xml version="1.0" encoding="utf-8"?>
+<file path=ppt/slides/slide14.xml><?xml version="1.0" encoding="utf-8"?>
 <p:sld xmlns:a="http://schemas.openxmlformats.org/drawingml/2006/main" xmlns:r="http://schemas.openxmlformats.org/officeDocument/2006/relationships" xmlns:p="http://schemas.openxmlformats.org/presentationml/2006/main">
   <p:cSld>
     <p:spTree>
@@ -5535,7 +5699,7 @@
             <a:fld id="{82183FE7-0049-48F5-AEC7-D407A93291DC}" type="slidenum">
               <a:rPr lang="de-DE" smtClean="0"/>
               <a:pPr/>
-              <a:t>13</a:t>
+              <a:t>14</a:t>
             </a:fld>
             <a:endParaRPr lang="de-DE" dirty="0"/>
           </a:p>
@@ -5610,7 +5774,7 @@
 </p:sld>
 </file>
 
-<file path=ppt/slides/slide14.xml><?xml version="1.0" encoding="utf-8"?>
+<file path=ppt/slides/slide15.xml><?xml version="1.0" encoding="utf-8"?>
 <p:sld xmlns:a="http://schemas.openxmlformats.org/drawingml/2006/main" xmlns:r="http://schemas.openxmlformats.org/officeDocument/2006/relationships" xmlns:p="http://schemas.openxmlformats.org/presentationml/2006/main">
   <p:cSld>
     <p:spTree>
@@ -5774,7 +5938,7 @@
             <a:fld id="{82183FE7-0049-48F5-AEC7-D407A93291DC}" type="slidenum">
               <a:rPr lang="de-DE" smtClean="0"/>
               <a:pPr/>
-              <a:t>14</a:t>
+              <a:t>15</a:t>
             </a:fld>
             <a:endParaRPr lang="de-DE" dirty="0"/>
           </a:p>
@@ -5798,6 +5962,13 @@
       <p:transition/>
     </mc:Fallback>
   </mc:AlternateContent>
+  <p:timing>
+    <p:tnLst>
+      <p:par>
+        <p:cTn id="1" dur="indefinite" restart="never" nodeType="tmRoot"/>
+      </p:par>
+    </p:tnLst>
+  </p:timing>
 </p:sld>
 </file>
 
@@ -6308,6 +6479,192 @@
           <a:lstStyle/>
           <a:p>
             <a:r>
+              <a:rPr lang="de-DE" dirty="0" smtClean="0"/>
+              <a:t>Task Breakdown(Brandschutztür</a:t>
+            </a:r>
+            <a:r>
+              <a:rPr lang="de-DE" dirty="0" smtClean="0"/>
+              <a:t>)</a:t>
+            </a:r>
+            <a:endParaRPr lang="de-DE" dirty="0"/>
+          </a:p>
+        </p:txBody>
+      </p:sp>
+      <p:sp>
+        <p:nvSpPr>
+          <p:cNvPr id="5" name="Inhaltsplatzhalter 4"/>
+          <p:cNvSpPr>
+            <a:spLocks noGrp="1"/>
+          </p:cNvSpPr>
+          <p:nvPr>
+            <p:ph sz="quarter" idx="10"/>
+          </p:nvPr>
+        </p:nvSpPr>
+        <p:spPr>
+          <a:xfrm>
+            <a:off x="468313" y="1918800"/>
+            <a:ext cx="8207375" cy="2806344"/>
+          </a:xfrm>
+        </p:spPr>
+        <p:txBody>
+          <a:bodyPr/>
+          <a:lstStyle/>
+          <a:p>
+            <a:r>
+              <a:rPr lang="de-DE" dirty="0" smtClean="0"/>
+              <a:t>Implementierung der Tür mit </a:t>
+            </a:r>
+            <a:r>
+              <a:rPr lang="de-DE" b="1" dirty="0" err="1">
+                <a:latin typeface="Courier New" panose="02070309020205020404" pitchFamily="49" charset="0"/>
+                <a:cs typeface="Courier New" panose="02070309020205020404" pitchFamily="49" charset="0"/>
+              </a:rPr>
+              <a:t>opening</a:t>
+            </a:r>
+            <a:r>
+              <a:rPr lang="de-DE" b="1" dirty="0">
+                <a:latin typeface="Courier New" panose="02070309020205020404" pitchFamily="49" charset="0"/>
+                <a:cs typeface="Courier New" panose="02070309020205020404" pitchFamily="49" charset="0"/>
+              </a:rPr>
+              <a:t>(), </a:t>
+            </a:r>
+            <a:r>
+              <a:rPr lang="de-DE" b="1" dirty="0" err="1">
+                <a:latin typeface="Courier New" panose="02070309020205020404" pitchFamily="49" charset="0"/>
+                <a:cs typeface="Courier New" panose="02070309020205020404" pitchFamily="49" charset="0"/>
+              </a:rPr>
+              <a:t>closing</a:t>
+            </a:r>
+            <a:r>
+              <a:rPr lang="de-DE" b="1" dirty="0">
+                <a:latin typeface="Courier New" panose="02070309020205020404" pitchFamily="49" charset="0"/>
+                <a:cs typeface="Courier New" panose="02070309020205020404" pitchFamily="49" charset="0"/>
+              </a:rPr>
+              <a:t>() </a:t>
+            </a:r>
+            <a:r>
+              <a:rPr lang="de-DE" dirty="0" smtClean="0"/>
+              <a:t>und </a:t>
+            </a:r>
+            <a:r>
+              <a:rPr lang="de-DE" b="1" dirty="0" err="1">
+                <a:latin typeface="Courier New" panose="02070309020205020404" pitchFamily="49" charset="0"/>
+                <a:cs typeface="Courier New" panose="02070309020205020404" pitchFamily="49" charset="0"/>
+              </a:rPr>
+              <a:t>isDooropen</a:t>
+            </a:r>
+            <a:r>
+              <a:rPr lang="de-DE" b="1" dirty="0">
+                <a:latin typeface="Courier New" panose="02070309020205020404" pitchFamily="49" charset="0"/>
+                <a:cs typeface="Courier New" panose="02070309020205020404" pitchFamily="49" charset="0"/>
+              </a:rPr>
+              <a:t>().</a:t>
+            </a:r>
+          </a:p>
+          <a:p>
+            <a:r>
+              <a:rPr lang="de-DE" dirty="0" smtClean="0"/>
+              <a:t>Verbindung mit dem </a:t>
+            </a:r>
+            <a:r>
+              <a:rPr lang="de-DE" dirty="0" err="1" smtClean="0"/>
+              <a:t>Timerframework</a:t>
+            </a:r>
+            <a:r>
+              <a:rPr lang="de-DE" dirty="0" smtClean="0"/>
+              <a:t> herstellen.</a:t>
+            </a:r>
+            <a:endParaRPr lang="de-DE" dirty="0" smtClean="0"/>
+          </a:p>
+          <a:p>
+            <a:r>
+              <a:rPr lang="de-DE" dirty="0" smtClean="0"/>
+              <a:t>Notwendige </a:t>
+            </a:r>
+            <a:r>
+              <a:rPr lang="de-DE" dirty="0" err="1" smtClean="0"/>
+              <a:t>Refactorings</a:t>
+            </a:r>
+            <a:r>
+              <a:rPr lang="de-DE" dirty="0" smtClean="0"/>
+              <a:t> Richtung SOLID Prinzipien machen.</a:t>
+            </a:r>
+          </a:p>
+          <a:p>
+            <a:endParaRPr lang="de-DE" dirty="0" smtClean="0"/>
+          </a:p>
+          <a:p>
+            <a:endParaRPr lang="de-DE" dirty="0" smtClean="0"/>
+          </a:p>
+          <a:p>
+            <a:endParaRPr lang="de-DE" dirty="0"/>
+          </a:p>
+          <a:p>
+            <a:endParaRPr lang="de-DE" dirty="0"/>
+          </a:p>
+        </p:txBody>
+      </p:sp>
+    </p:spTree>
+    <p:extLst>
+      <p:ext uri="{BB962C8B-B14F-4D97-AF65-F5344CB8AC3E}">
+        <p14:creationId xmlns:p14="http://schemas.microsoft.com/office/powerpoint/2010/main" val="1700104954"/>
+      </p:ext>
+    </p:extLst>
+  </p:cSld>
+  <p:clrMapOvr>
+    <a:masterClrMapping/>
+  </p:clrMapOvr>
+  <mc:AlternateContent xmlns:mc="http://schemas.openxmlformats.org/markup-compatibility/2006" xmlns:p14="http://schemas.microsoft.com/office/powerpoint/2010/main">
+    <mc:Choice Requires="p14">
+      <p:transition p14:dur="0"/>
+    </mc:Choice>
+    <mc:Fallback xmlns="">
+      <p:transition/>
+    </mc:Fallback>
+  </mc:AlternateContent>
+  <p:timing>
+    <p:tnLst>
+      <p:par>
+        <p:cTn id="1" dur="indefinite" restart="never" nodeType="tmRoot"/>
+      </p:par>
+    </p:tnLst>
+  </p:timing>
+</p:sld>
+</file>
+
+<file path=ppt/slides/slide5.xml><?xml version="1.0" encoding="utf-8"?>
+<p:sld xmlns:a="http://schemas.openxmlformats.org/drawingml/2006/main" xmlns:r="http://schemas.openxmlformats.org/officeDocument/2006/relationships" xmlns:p="http://schemas.openxmlformats.org/presentationml/2006/main">
+  <p:cSld>
+    <p:spTree>
+      <p:nvGrpSpPr>
+        <p:cNvPr id="1" name=""/>
+        <p:cNvGrpSpPr/>
+        <p:nvPr/>
+      </p:nvGrpSpPr>
+      <p:grpSpPr>
+        <a:xfrm>
+          <a:off x="0" y="0"/>
+          <a:ext cx="0" cy="0"/>
+          <a:chOff x="0" y="0"/>
+          <a:chExt cx="0" cy="0"/>
+        </a:xfrm>
+      </p:grpSpPr>
+      <p:sp>
+        <p:nvSpPr>
+          <p:cNvPr id="4" name="Titel 3"/>
+          <p:cNvSpPr>
+            <a:spLocks noGrp="1"/>
+          </p:cNvSpPr>
+          <p:nvPr>
+            <p:ph type="title"/>
+          </p:nvPr>
+        </p:nvSpPr>
+        <p:spPr/>
+        <p:txBody>
+          <a:bodyPr/>
+          <a:lstStyle/>
+          <a:p>
+            <a:r>
               <a:rPr lang="de-DE" dirty="0" err="1" smtClean="0"/>
               <a:t>Timer</a:t>
             </a:r>
@@ -6464,7 +6821,7 @@
 </p:sld>
 </file>
 
-<file path=ppt/slides/slide5.xml><?xml version="1.0" encoding="utf-8"?>
+<file path=ppt/slides/slide6.xml><?xml version="1.0" encoding="utf-8"?>
 <p:sld xmlns:a="http://schemas.openxmlformats.org/drawingml/2006/main" xmlns:r="http://schemas.openxmlformats.org/officeDocument/2006/relationships" xmlns:p="http://schemas.openxmlformats.org/presentationml/2006/main">
   <p:cSld>
     <p:spTree>
@@ -6591,7 +6948,7 @@
             <a:fld id="{82183FE7-0049-48F5-AEC7-D407A93291DC}" type="slidenum">
               <a:rPr lang="de-DE" smtClean="0"/>
               <a:pPr/>
-              <a:t>5</a:t>
+              <a:t>6</a:t>
             </a:fld>
             <a:endParaRPr lang="de-DE" dirty="0"/>
           </a:p>
@@ -7035,7 +7392,7 @@
 </p:sld>
 </file>
 
-<file path=ppt/slides/slide6.xml><?xml version="1.0" encoding="utf-8"?>
+<file path=ppt/slides/slide7.xml><?xml version="1.0" encoding="utf-8"?>
 <p:sld xmlns:a="http://schemas.openxmlformats.org/drawingml/2006/main" xmlns:r="http://schemas.openxmlformats.org/officeDocument/2006/relationships" xmlns:p="http://schemas.openxmlformats.org/presentationml/2006/main">
   <p:cSld>
     <p:spTree>
@@ -7161,7 +7518,7 @@
             <a:fld id="{82183FE7-0049-48F5-AEC7-D407A93291DC}" type="slidenum">
               <a:rPr lang="de-DE" smtClean="0"/>
               <a:pPr/>
-              <a:t>6</a:t>
+              <a:t>7</a:t>
             </a:fld>
             <a:endParaRPr lang="de-DE" dirty="0"/>
           </a:p>
@@ -7329,7 +7686,7 @@
 </p:sld>
 </file>
 
-<file path=ppt/slides/slide7.xml><?xml version="1.0" encoding="utf-8"?>
+<file path=ppt/slides/slide8.xml><?xml version="1.0" encoding="utf-8"?>
 <p:sld xmlns:a="http://schemas.openxmlformats.org/drawingml/2006/main" xmlns:r="http://schemas.openxmlformats.org/officeDocument/2006/relationships" xmlns:p="http://schemas.openxmlformats.org/presentationml/2006/main">
   <p:cSld>
     <p:spTree>
@@ -7466,7 +7823,7 @@
             <a:fld id="{82183FE7-0049-48F5-AEC7-D407A93291DC}" type="slidenum">
               <a:rPr lang="de-DE" smtClean="0"/>
               <a:pPr/>
-              <a:t>7</a:t>
+              <a:t>8</a:t>
             </a:fld>
             <a:endParaRPr lang="de-DE" dirty="0"/>
           </a:p>
@@ -7541,7 +7898,7 @@
 </p:sld>
 </file>
 
-<file path=ppt/slides/slide8.xml><?xml version="1.0" encoding="utf-8"?>
+<file path=ppt/slides/slide9.xml><?xml version="1.0" encoding="utf-8"?>
 <p:sld xmlns:a="http://schemas.openxmlformats.org/drawingml/2006/main" xmlns:r="http://schemas.openxmlformats.org/officeDocument/2006/relationships" xmlns:p="http://schemas.openxmlformats.org/presentationml/2006/main">
   <p:cSld>
     <p:spTree>
@@ -7962,162 +8319,6 @@
     <p:extLst>
       <p:ext uri="{BB962C8B-B14F-4D97-AF65-F5344CB8AC3E}">
         <p14:creationId xmlns:p14="http://schemas.microsoft.com/office/powerpoint/2010/main" val="694267454"/>
-      </p:ext>
-    </p:extLst>
-  </p:cSld>
-  <p:clrMapOvr>
-    <a:masterClrMapping/>
-  </p:clrMapOvr>
-  <mc:AlternateContent xmlns:mc="http://schemas.openxmlformats.org/markup-compatibility/2006" xmlns:p14="http://schemas.microsoft.com/office/powerpoint/2010/main">
-    <mc:Choice Requires="p14">
-      <p:transition p14:dur="0"/>
-    </mc:Choice>
-    <mc:Fallback xmlns="">
-      <p:transition/>
-    </mc:Fallback>
-  </mc:AlternateContent>
-  <p:timing>
-    <p:tnLst>
-      <p:par>
-        <p:cTn id="1" dur="indefinite" restart="never" nodeType="tmRoot"/>
-      </p:par>
-    </p:tnLst>
-  </p:timing>
-</p:sld>
-</file>
-
-<file path=ppt/slides/slide9.xml><?xml version="1.0" encoding="utf-8"?>
-<p:sld xmlns:a="http://schemas.openxmlformats.org/drawingml/2006/main" xmlns:r="http://schemas.openxmlformats.org/officeDocument/2006/relationships" xmlns:p="http://schemas.openxmlformats.org/presentationml/2006/main">
-  <p:cSld>
-    <p:spTree>
-      <p:nvGrpSpPr>
-        <p:cNvPr id="1" name=""/>
-        <p:cNvGrpSpPr/>
-        <p:nvPr/>
-      </p:nvGrpSpPr>
-      <p:grpSpPr>
-        <a:xfrm>
-          <a:off x="0" y="0"/>
-          <a:ext cx="0" cy="0"/>
-          <a:chOff x="0" y="0"/>
-          <a:chExt cx="0" cy="0"/>
-        </a:xfrm>
-      </p:grpSpPr>
-      <p:sp>
-        <p:nvSpPr>
-          <p:cNvPr id="2" name="Titel 1"/>
-          <p:cNvSpPr>
-            <a:spLocks noGrp="1"/>
-          </p:cNvSpPr>
-          <p:nvPr>
-            <p:ph type="title"/>
-          </p:nvPr>
-        </p:nvSpPr>
-        <p:spPr/>
-        <p:txBody>
-          <a:bodyPr/>
-          <a:lstStyle/>
-          <a:p>
-            <a:r>
-              <a:rPr lang="de-DE" dirty="0" smtClean="0"/>
-              <a:t>Lösung: Interfaces Separieren</a:t>
-            </a:r>
-            <a:endParaRPr lang="de-DE" dirty="0"/>
-          </a:p>
-        </p:txBody>
-      </p:sp>
-      <p:sp>
-        <p:nvSpPr>
-          <p:cNvPr id="4" name="Datumsplatzhalter 3"/>
-          <p:cNvSpPr>
-            <a:spLocks noGrp="1"/>
-          </p:cNvSpPr>
-          <p:nvPr>
-            <p:ph type="dt" sz="half" idx="11"/>
-          </p:nvPr>
-        </p:nvSpPr>
-        <p:spPr/>
-        <p:txBody>
-          <a:bodyPr/>
-          <a:lstStyle/>
-          <a:p>
-            <a:fld id="{963731B5-71BB-4A04-98EE-C4E60CDE0482}" type="datetime2">
-              <a:rPr lang="de-DE" smtClean="0"/>
-              <a:t>Donnerstag, 12. September 2013</a:t>
-            </a:fld>
-            <a:endParaRPr lang="de-DE" dirty="0"/>
-          </a:p>
-        </p:txBody>
-      </p:sp>
-      <p:sp>
-        <p:nvSpPr>
-          <p:cNvPr id="5" name="Foliennummernplatzhalter 4"/>
-          <p:cNvSpPr>
-            <a:spLocks noGrp="1"/>
-          </p:cNvSpPr>
-          <p:nvPr>
-            <p:ph type="sldNum" sz="quarter" idx="13"/>
-          </p:nvPr>
-        </p:nvSpPr>
-        <p:spPr/>
-        <p:txBody>
-          <a:bodyPr/>
-          <a:lstStyle/>
-          <a:p>
-            <a:fld id="{82183FE7-0049-48F5-AEC7-D407A93291DC}" type="slidenum">
-              <a:rPr lang="de-DE" smtClean="0"/>
-              <a:pPr/>
-              <a:t>9</a:t>
-            </a:fld>
-            <a:endParaRPr lang="de-DE" dirty="0"/>
-          </a:p>
-        </p:txBody>
-      </p:sp>
-      <p:pic>
-        <p:nvPicPr>
-          <p:cNvPr id="6146" name="Picture 2" descr="D:\Dropbox\neusta\Software Qualität\SOLID\Secont.jpg"/>
-          <p:cNvPicPr>
-            <a:picLocks noChangeAspect="1" noChangeArrowheads="1"/>
-          </p:cNvPicPr>
-          <p:nvPr/>
-        </p:nvPicPr>
-        <p:blipFill>
-          <a:blip r:embed="rId2">
-            <a:extLst>
-              <a:ext uri="{28A0092B-C50C-407E-A947-70E740481C1C}">
-                <a14:useLocalDpi xmlns:a14="http://schemas.microsoft.com/office/drawing/2010/main" val="0"/>
-              </a:ext>
-            </a:extLst>
-          </a:blip>
-          <a:srcRect/>
-          <a:stretch>
-            <a:fillRect/>
-          </a:stretch>
-        </p:blipFill>
-        <p:spPr bwMode="auto">
-          <a:xfrm>
-            <a:off x="395536" y="1556792"/>
-            <a:ext cx="7452041" cy="3672408"/>
-          </a:xfrm>
-          <a:prstGeom prst="rect">
-            <a:avLst/>
-          </a:prstGeom>
-          <a:noFill/>
-          <a:extLst>
-            <a:ext uri="{909E8E84-426E-40DD-AFC4-6F175D3DCCD1}">
-              <a14:hiddenFill xmlns:a14="http://schemas.microsoft.com/office/drawing/2010/main">
-                <a:solidFill>
-                  <a:srgbClr val="FFFFFF"/>
-                </a:solidFill>
-              </a14:hiddenFill>
-            </a:ext>
-          </a:extLst>
-        </p:spPr>
-      </p:pic>
-    </p:spTree>
-    <p:extLst>
-      <p:ext uri="{BB962C8B-B14F-4D97-AF65-F5344CB8AC3E}">
-        <p14:creationId xmlns:p14="http://schemas.microsoft.com/office/powerpoint/2010/main" val="1609465115"/>
       </p:ext>
     </p:extLst>
   </p:cSld>

</xml_diff>